<commit_message>
Hand-on-basic presentations: minor corrections
</commit_message>
<xml_diff>
--- a/Hands-on-basic/Slides_pptx/Day3.pptx
+++ b/Hands-on-basic/Slides_pptx/Day3.pptx
@@ -21543,93 +21543,118 @@
                 <a:solidFill>
                   <a:schemeClr val="lt1"/>
                 </a:solidFill>
-              </a:rPr>
-              <a:t>Tutors: </a:t>
-            </a:r>
-            <a:r>
-              <a:rPr lang="en-US" sz="1200" b="1" i="0" u="none" strike="noStrike" cap="none" dirty="0">
+                <a:latin typeface="Lato" panose="020F0502020204030203" pitchFamily="34" charset="0"/>
+                <a:ea typeface="Lato" panose="020F0502020204030203" pitchFamily="34" charset="0"/>
+                <a:cs typeface="Lato" panose="020F0502020204030203" pitchFamily="34" charset="0"/>
+              </a:rPr>
+              <a:t>Tutors:  </a:t>
+            </a:r>
+            <a:r>
+              <a:rPr lang="en-US" sz="1800" b="1" dirty="0">
                 <a:solidFill>
                   <a:schemeClr val="lt1"/>
                 </a:solidFill>
-              </a:rPr>
-              <a:t> </a:t>
-            </a:r>
-            <a:r>
-              <a:rPr lang="en-US" sz="1200" b="1" dirty="0">
+                <a:latin typeface="Lato" panose="020F0502020204030203" pitchFamily="34" charset="0"/>
+                <a:ea typeface="Lato" panose="020F0502020204030203" pitchFamily="34" charset="0"/>
+                <a:cs typeface="Lato" panose="020F0502020204030203" pitchFamily="34" charset="0"/>
+              </a:rPr>
+              <a:t>Alberto Carta / Chiara Cignarella / Nelson </a:t>
+            </a:r>
+            <a:r>
+              <a:rPr lang="en-US" sz="1800" b="1" dirty="0" err="1">
                 <a:solidFill>
                   <a:schemeClr val="lt1"/>
                 </a:solidFill>
-              </a:rPr>
-              <a:t>Alberto Carta / Chiara Cignarella / Nelson </a:t>
-            </a:r>
-            <a:r>
-              <a:rPr lang="en-US" sz="1200" b="1" dirty="0" err="1">
+                <a:latin typeface="Lato" panose="020F0502020204030203" pitchFamily="34" charset="0"/>
+                <a:ea typeface="Lato" panose="020F0502020204030203" pitchFamily="34" charset="0"/>
+                <a:cs typeface="Lato" panose="020F0502020204030203" pitchFamily="34" charset="0"/>
+              </a:rPr>
+              <a:t>Dzade</a:t>
+            </a:r>
+            <a:r>
+              <a:rPr lang="en-US" sz="1800" b="1" dirty="0">
                 <a:solidFill>
                   <a:schemeClr val="lt1"/>
                 </a:solidFill>
-              </a:rPr>
-              <a:t>Dzade</a:t>
-            </a:r>
-            <a:r>
-              <a:rPr lang="en-US" sz="1200" b="1" dirty="0">
+                <a:latin typeface="Lato" panose="020F0502020204030203" pitchFamily="34" charset="0"/>
+                <a:ea typeface="Lato" panose="020F0502020204030203" pitchFamily="34" charset="0"/>
+                <a:cs typeface="Lato" panose="020F0502020204030203" pitchFamily="34" charset="0"/>
+              </a:rPr>
+              <a:t> / George </a:t>
+            </a:r>
+            <a:r>
+              <a:rPr lang="en-US" sz="1800" b="1" dirty="0" err="1">
                 <a:solidFill>
                   <a:schemeClr val="lt1"/>
                 </a:solidFill>
-              </a:rPr>
-              <a:t> / George </a:t>
-            </a:r>
-            <a:r>
-              <a:rPr lang="en-US" sz="1200" b="1" dirty="0" err="1">
+                <a:latin typeface="Lato" panose="020F0502020204030203" pitchFamily="34" charset="0"/>
+                <a:ea typeface="Lato" panose="020F0502020204030203" pitchFamily="34" charset="0"/>
+                <a:cs typeface="Lato" panose="020F0502020204030203" pitchFamily="34" charset="0"/>
+              </a:rPr>
+              <a:t>Manyali</a:t>
+            </a:r>
+            <a:r>
+              <a:rPr lang="en-US" sz="1800" b="1" dirty="0">
                 <a:solidFill>
                   <a:schemeClr val="lt1"/>
                 </a:solidFill>
-              </a:rPr>
-              <a:t>Manyali</a:t>
-            </a:r>
-            <a:r>
-              <a:rPr lang="en-US" sz="1200" b="1" dirty="0">
+                <a:latin typeface="Lato" panose="020F0502020204030203" pitchFamily="34" charset="0"/>
+                <a:ea typeface="Lato" panose="020F0502020204030203" pitchFamily="34" charset="0"/>
+                <a:cs typeface="Lato" panose="020F0502020204030203" pitchFamily="34" charset="0"/>
+              </a:rPr>
+              <a:t> / James Sifuna / Fatema Mohamed / </a:t>
+            </a:r>
+            <a:r>
+              <a:rPr lang="en-US" sz="1800" b="1" dirty="0" err="1">
                 <a:solidFill>
                   <a:schemeClr val="lt1"/>
                 </a:solidFill>
-              </a:rPr>
-              <a:t> / James Sifuna / Fatema Mohamed / </a:t>
-            </a:r>
-            <a:r>
-              <a:rPr lang="en-US" sz="1200" b="1" dirty="0" err="1">
+                <a:latin typeface="Lato" panose="020F0502020204030203" pitchFamily="34" charset="0"/>
+                <a:ea typeface="Lato" panose="020F0502020204030203" pitchFamily="34" charset="0"/>
+                <a:cs typeface="Lato" panose="020F0502020204030203" pitchFamily="34" charset="0"/>
+              </a:rPr>
+              <a:t>Omamuyovwi</a:t>
+            </a:r>
+            <a:r>
+              <a:rPr lang="en-US" sz="1800" b="1" dirty="0">
                 <a:solidFill>
                   <a:schemeClr val="lt1"/>
                 </a:solidFill>
-              </a:rPr>
-              <a:t>Omamuyovwi</a:t>
-            </a:r>
-            <a:r>
-              <a:rPr lang="en-US" sz="1200" b="1" dirty="0">
+                <a:latin typeface="Lato" panose="020F0502020204030203" pitchFamily="34" charset="0"/>
+                <a:ea typeface="Lato" panose="020F0502020204030203" pitchFamily="34" charset="0"/>
+                <a:cs typeface="Lato" panose="020F0502020204030203" pitchFamily="34" charset="0"/>
+              </a:rPr>
+              <a:t> Rita </a:t>
+            </a:r>
+            <a:r>
+              <a:rPr lang="en-US" sz="1800" b="1" dirty="0" err="1">
                 <a:solidFill>
                   <a:schemeClr val="lt1"/>
                 </a:solidFill>
-              </a:rPr>
-              <a:t> Rita </a:t>
-            </a:r>
-            <a:r>
-              <a:rPr lang="en-US" sz="1200" b="1" dirty="0" err="1">
+                <a:latin typeface="Lato" panose="020F0502020204030203" pitchFamily="34" charset="0"/>
+                <a:ea typeface="Lato" panose="020F0502020204030203" pitchFamily="34" charset="0"/>
+                <a:cs typeface="Lato" panose="020F0502020204030203" pitchFamily="34" charset="0"/>
+              </a:rPr>
+              <a:t>Jolayemi</a:t>
+            </a:r>
+            <a:r>
+              <a:rPr lang="en-US" sz="1800" b="1" dirty="0">
                 <a:solidFill>
                   <a:schemeClr val="lt1"/>
                 </a:solidFill>
-              </a:rPr>
-              <a:t>Jolayemi</a:t>
-            </a:r>
-            <a:r>
-              <a:rPr lang="en-US" sz="1200" b="1" dirty="0">
-                <a:solidFill>
-                  <a:schemeClr val="lt1"/>
-                </a:solidFill>
+                <a:latin typeface="Lato" panose="020F0502020204030203" pitchFamily="34" charset="0"/>
+                <a:ea typeface="Lato" panose="020F0502020204030203" pitchFamily="34" charset="0"/>
+                <a:cs typeface="Lato" panose="020F0502020204030203" pitchFamily="34" charset="0"/>
               </a:rPr>
               <a:t> / Maram Ali Ahmed Musa</a:t>
             </a:r>
-            <a:endParaRPr sz="1200" b="1" i="0" u="none" strike="noStrike" cap="none" dirty="0">
+            <a:endParaRPr sz="1800" b="1" i="0" u="none" strike="noStrike" cap="none" dirty="0">
               <a:solidFill>
                 <a:schemeClr val="lt1"/>
               </a:solidFill>
+              <a:latin typeface="Lato" panose="020F0502020204030203" pitchFamily="34" charset="0"/>
+              <a:ea typeface="Lato" panose="020F0502020204030203" pitchFamily="34" charset="0"/>
+              <a:cs typeface="Lato" panose="020F0502020204030203" pitchFamily="34" charset="0"/>
             </a:endParaRPr>
           </a:p>
         </p:txBody>
@@ -21724,142 +21749,123 @@
       </p:sp>
       <p:sp>
         <p:nvSpPr>
-          <p:cNvPr id="219" name="Google Shape;219;p40"/>
-          <p:cNvSpPr txBox="1">
-            <a:spLocks noGrp="1"/>
-          </p:cNvSpPr>
-          <p:nvPr>
-            <p:ph type="subTitle" idx="1"/>
-          </p:nvPr>
+          <p:cNvPr id="3" name="TextBox 2">
+            <a:extLst>
+              <a:ext uri="{FF2B5EF4-FFF2-40B4-BE49-F238E27FC236}">
+                <a16:creationId xmlns:a16="http://schemas.microsoft.com/office/drawing/2014/main" id="{6D628A81-8565-F510-FBE8-E1B015063A45}"/>
+              </a:ext>
+            </a:extLst>
+          </p:cNvPr>
+          <p:cNvSpPr txBox="1"/>
+          <p:nvPr/>
         </p:nvSpPr>
         <p:spPr>
           <a:xfrm>
-            <a:off x="2540900" y="4232447"/>
-            <a:ext cx="6730500" cy="1564500"/>
+            <a:off x="2934269" y="4162567"/>
+            <a:ext cx="6141492" cy="1554272"/>
           </a:xfrm>
           <a:prstGeom prst="rect">
             <a:avLst/>
           </a:prstGeom>
+          <a:noFill/>
         </p:spPr>
         <p:txBody>
-          <a:bodyPr spcFirstLastPara="1" wrap="square" lIns="103175" tIns="103175" rIns="103175" bIns="103175" anchor="b" anchorCtr="0">
-            <a:normAutofit fontScale="70000" lnSpcReduction="20000"/>
+          <a:bodyPr wrap="square" rtlCol="0">
+            <a:spAutoFit/>
           </a:bodyPr>
           <a:lstStyle/>
           <a:p>
-            <a:pPr marL="0" lvl="0" indent="0" algn="l" rtl="0">
-              <a:spcBef>
-                <a:spcPts val="0"/>
-              </a:spcBef>
-              <a:spcAft>
-                <a:spcPts val="0"/>
-              </a:spcAft>
-              <a:buNone/>
+            <a:pPr lvl="0">
+              <a:buClr>
+                <a:schemeClr val="bg1"/>
+              </a:buClr>
             </a:pPr>
             <a:r>
-              <a:rPr lang="en-US" sz="2640" b="1" dirty="0"/>
+              <a:rPr lang="en-US" sz="1900" b="1" dirty="0">
+                <a:solidFill>
+                  <a:schemeClr val="bg1"/>
+                </a:solidFill>
+                <a:latin typeface="Lato" panose="020F0502020204030203" pitchFamily="34" charset="0"/>
+                <a:ea typeface="Lato" panose="020F0502020204030203" pitchFamily="34" charset="0"/>
+                <a:cs typeface="Lato" panose="020F0502020204030203" pitchFamily="34" charset="0"/>
+              </a:rPr>
               <a:t>Today’s Themes:</a:t>
             </a:r>
-            <a:endParaRPr sz="2640" b="1" dirty="0"/>
-          </a:p>
-          <a:p>
-            <a:pPr marL="0" lvl="0" indent="0" algn="l" rtl="0">
-              <a:spcBef>
-                <a:spcPts val="0"/>
-              </a:spcBef>
-              <a:spcAft>
-                <a:spcPts val="0"/>
-              </a:spcAft>
-              <a:buNone/>
+          </a:p>
+          <a:p>
+            <a:pPr lvl="0">
+              <a:buClr>
+                <a:schemeClr val="bg1"/>
+              </a:buClr>
             </a:pPr>
-            <a:endParaRPr dirty="0"/>
-          </a:p>
-          <a:p>
-            <a:pPr marL="457200" lvl="0" indent="-307975" algn="l" rtl="0">
-              <a:spcBef>
-                <a:spcPts val="0"/>
-              </a:spcBef>
-              <a:spcAft>
-                <a:spcPts val="0"/>
-              </a:spcAft>
+            <a:endParaRPr lang="en-US" sz="1900" dirty="0">
+              <a:solidFill>
+                <a:schemeClr val="bg1"/>
+              </a:solidFill>
+              <a:latin typeface="Lato" panose="020F0502020204030203" pitchFamily="34" charset="0"/>
+              <a:ea typeface="Lato" panose="020F0502020204030203" pitchFamily="34" charset="0"/>
+              <a:cs typeface="Lato" panose="020F0502020204030203" pitchFamily="34" charset="0"/>
+            </a:endParaRPr>
+          </a:p>
+          <a:p>
+            <a:pPr marL="457200" lvl="0" indent="-307975">
+              <a:buClr>
+                <a:schemeClr val="bg1"/>
+              </a:buClr>
               <a:buSzPct val="100000"/>
               <a:buAutoNum type="arabicParenR"/>
             </a:pPr>
             <a:r>
-              <a:rPr lang="en-US" dirty="0"/>
+              <a:rPr lang="en-US" sz="1900" dirty="0">
+                <a:solidFill>
+                  <a:schemeClr val="bg1"/>
+                </a:solidFill>
+                <a:latin typeface="Lato" panose="020F0502020204030203" pitchFamily="34" charset="0"/>
+                <a:ea typeface="Lato" panose="020F0502020204030203" pitchFamily="34" charset="0"/>
+                <a:cs typeface="Lato" panose="020F0502020204030203" pitchFamily="34" charset="0"/>
+              </a:rPr>
               <a:t>Performing band structure calculations</a:t>
             </a:r>
-            <a:endParaRPr dirty="0"/>
-          </a:p>
-          <a:p>
-            <a:pPr marL="457200" lvl="0" indent="0" algn="l" rtl="0">
-              <a:spcBef>
-                <a:spcPts val="0"/>
-              </a:spcBef>
-              <a:spcAft>
-                <a:spcPts val="0"/>
-              </a:spcAft>
-              <a:buNone/>
-            </a:pPr>
-            <a:endParaRPr dirty="0"/>
-          </a:p>
-          <a:p>
-            <a:pPr marL="457200" lvl="0" indent="-307975" algn="l" rtl="0">
-              <a:spcBef>
-                <a:spcPts val="0"/>
-              </a:spcBef>
-              <a:spcAft>
-                <a:spcPts val="0"/>
-              </a:spcAft>
+          </a:p>
+          <a:p>
+            <a:pPr marL="457200" lvl="0" indent="-307975">
+              <a:buClr>
+                <a:schemeClr val="bg1"/>
+              </a:buClr>
               <a:buSzPct val="100000"/>
               <a:buAutoNum type="arabicParenR"/>
             </a:pPr>
             <a:r>
-              <a:rPr lang="en-US" dirty="0"/>
+              <a:rPr lang="en-US" sz="1900" dirty="0">
+                <a:solidFill>
+                  <a:schemeClr val="bg1"/>
+                </a:solidFill>
+                <a:latin typeface="Lato" panose="020F0502020204030203" pitchFamily="34" charset="0"/>
+                <a:ea typeface="Lato" panose="020F0502020204030203" pitchFamily="34" charset="0"/>
+                <a:cs typeface="Lato" panose="020F0502020204030203" pitchFamily="34" charset="0"/>
+              </a:rPr>
               <a:t>DFT calculations for metals: smearing parameters</a:t>
             </a:r>
-            <a:endParaRPr dirty="0"/>
-          </a:p>
-          <a:p>
-            <a:pPr marL="457200" lvl="0" indent="0" algn="l" rtl="0">
-              <a:spcBef>
-                <a:spcPts val="0"/>
-              </a:spcBef>
-              <a:spcAft>
-                <a:spcPts val="0"/>
-              </a:spcAft>
-              <a:buNone/>
-            </a:pPr>
-            <a:endParaRPr dirty="0"/>
-          </a:p>
-          <a:p>
-            <a:pPr marL="457200" lvl="0" indent="-307975" algn="l" rtl="0">
-              <a:spcBef>
-                <a:spcPts val="0"/>
-              </a:spcBef>
-              <a:spcAft>
-                <a:spcPts val="0"/>
-              </a:spcAft>
+          </a:p>
+          <a:p>
+            <a:pPr marL="457200" lvl="0" indent="-307975">
+              <a:buClr>
+                <a:schemeClr val="bg1"/>
+              </a:buClr>
               <a:buSzPct val="100000"/>
               <a:buAutoNum type="arabicParenR"/>
             </a:pPr>
             <a:r>
-              <a:rPr lang="en-US" dirty="0"/>
+              <a:rPr lang="en-US" sz="1900" dirty="0">
+                <a:solidFill>
+                  <a:schemeClr val="bg1"/>
+                </a:solidFill>
+                <a:latin typeface="Lato" panose="020F0502020204030203" pitchFamily="34" charset="0"/>
+                <a:ea typeface="Lato" panose="020F0502020204030203" pitchFamily="34" charset="0"/>
+                <a:cs typeface="Lato" panose="020F0502020204030203" pitchFamily="34" charset="0"/>
+              </a:rPr>
               <a:t>XC functionals: LDA and PBE</a:t>
             </a:r>
-            <a:endParaRPr dirty="0"/>
-          </a:p>
-          <a:p>
-            <a:pPr marL="0" lvl="0" indent="0" algn="l" rtl="0">
-              <a:spcBef>
-                <a:spcPts val="0"/>
-              </a:spcBef>
-              <a:spcAft>
-                <a:spcPts val="0"/>
-              </a:spcAft>
-              <a:buNone/>
-            </a:pPr>
-            <a:endParaRPr dirty="0"/>
           </a:p>
         </p:txBody>
       </p:sp>

</xml_diff>